<commit_message>
more work on power point
</commit_message>
<xml_diff>
--- a/Nixon Bohr.pptx
+++ b/Nixon Bohr.pptx
@@ -114,6 +114,11 @@
       </a:defRPr>
     </a:lvl9pPr>
   </p:defaultTextStyle>
+  <p:extLst>
+    <p:ext uri="{EFAFB233-063F-42B5-8137-9DF3F51BA10A}">
+      <p15:sldGuideLst xmlns:p15="http://schemas.microsoft.com/office/powerpoint/2012/main"/>
+    </p:ext>
+  </p:extLst>
 </p:presentation>
 </file>
 
@@ -174,7 +179,7 @@
           <a:noFill/>
           <a:extLst>
             <a:ext uri="{909E8E84-426E-40dd-AFC4-6F175D3DCCD1}">
-              <a14:hiddenFill xmlns:a14="http://schemas.microsoft.com/office/drawing/2010/main" xmlns="">
+              <a14:hiddenFill xmlns="" xmlns:a14="http://schemas.microsoft.com/office/drawing/2010/main">
                 <a:solidFill>
                   <a:srgbClr val="FFFFFF"/>
                 </a:solidFill>
@@ -233,7 +238,7 @@
             </a:ln>
             <a:extLst>
               <a:ext uri="{91240B29-F687-4f45-9708-019B960494DF}">
-                <a14:hiddenLine xmlns:a14="http://schemas.microsoft.com/office/drawing/2010/main" xmlns="" w="9525">
+                <a14:hiddenLine xmlns="" xmlns:a14="http://schemas.microsoft.com/office/drawing/2010/main" w="9525">
                   <a:solidFill>
                     <a:srgbClr val="000000"/>
                   </a:solidFill>
@@ -323,7 +328,7 @@
             </a:ln>
             <a:extLst>
               <a:ext uri="{91240B29-F687-4f45-9708-019B960494DF}">
-                <a14:hiddenLine xmlns:a14="http://schemas.microsoft.com/office/drawing/2010/main" xmlns="" w="9525">
+                <a14:hiddenLine xmlns="" xmlns:a14="http://schemas.microsoft.com/office/drawing/2010/main" w="9525">
                   <a:solidFill>
                     <a:srgbClr val="000000"/>
                   </a:solidFill>
@@ -413,7 +418,7 @@
             </a:ln>
             <a:extLst>
               <a:ext uri="{91240B29-F687-4f45-9708-019B960494DF}">
-                <a14:hiddenLine xmlns:a14="http://schemas.microsoft.com/office/drawing/2010/main" xmlns="" w="9525">
+                <a14:hiddenLine xmlns="" xmlns:a14="http://schemas.microsoft.com/office/drawing/2010/main" w="9525">
                   <a:solidFill>
                     <a:srgbClr val="000000"/>
                   </a:solidFill>
@@ -447,7 +452,7 @@
             </a:ln>
             <a:extLst>
               <a:ext uri="{91240B29-F687-4f45-9708-019B960494DF}">
-                <a14:hiddenLine xmlns:a14="http://schemas.microsoft.com/office/drawing/2010/main" xmlns="" w="9525">
+                <a14:hiddenLine xmlns="" xmlns:a14="http://schemas.microsoft.com/office/drawing/2010/main" w="9525">
                   <a:solidFill>
                     <a:srgbClr val="000000"/>
                   </a:solidFill>
@@ -537,7 +542,7 @@
             </a:ln>
             <a:extLst>
               <a:ext uri="{91240B29-F687-4f45-9708-019B960494DF}">
-                <a14:hiddenLine xmlns:a14="http://schemas.microsoft.com/office/drawing/2010/main" xmlns="" w="9525">
+                <a14:hiddenLine xmlns="" xmlns:a14="http://schemas.microsoft.com/office/drawing/2010/main" w="9525">
                   <a:solidFill>
                     <a:srgbClr val="000000"/>
                   </a:solidFill>
@@ -599,7 +604,7 @@
             </a:ln>
             <a:extLst>
               <a:ext uri="{91240B29-F687-4f45-9708-019B960494DF}">
-                <a14:hiddenLine xmlns:a14="http://schemas.microsoft.com/office/drawing/2010/main" xmlns="" w="9525">
+                <a14:hiddenLine xmlns="" xmlns:a14="http://schemas.microsoft.com/office/drawing/2010/main" w="9525">
                   <a:solidFill>
                     <a:srgbClr val="000000"/>
                   </a:solidFill>
@@ -661,7 +666,7 @@
             </a:ln>
             <a:extLst>
               <a:ext uri="{91240B29-F687-4f45-9708-019B960494DF}">
-                <a14:hiddenLine xmlns:a14="http://schemas.microsoft.com/office/drawing/2010/main" xmlns="" w="9525">
+                <a14:hiddenLine xmlns="" xmlns:a14="http://schemas.microsoft.com/office/drawing/2010/main" w="9525">
                   <a:solidFill>
                     <a:srgbClr val="000000"/>
                   </a:solidFill>
@@ -751,7 +756,7 @@
             </a:ln>
             <a:extLst>
               <a:ext uri="{91240B29-F687-4f45-9708-019B960494DF}">
-                <a14:hiddenLine xmlns:a14="http://schemas.microsoft.com/office/drawing/2010/main" xmlns="" w="9525">
+                <a14:hiddenLine xmlns="" xmlns:a14="http://schemas.microsoft.com/office/drawing/2010/main" w="9525">
                   <a:solidFill>
                     <a:srgbClr val="000000"/>
                   </a:solidFill>
@@ -813,7 +818,7 @@
             </a:ln>
             <a:extLst>
               <a:ext uri="{91240B29-F687-4f45-9708-019B960494DF}">
-                <a14:hiddenLine xmlns:a14="http://schemas.microsoft.com/office/drawing/2010/main" xmlns="" w="9525">
+                <a14:hiddenLine xmlns="" xmlns:a14="http://schemas.microsoft.com/office/drawing/2010/main" w="9525">
                   <a:solidFill>
                     <a:srgbClr val="000000"/>
                   </a:solidFill>
@@ -875,7 +880,7 @@
             </a:ln>
             <a:extLst>
               <a:ext uri="{91240B29-F687-4f45-9708-019B960494DF}">
-                <a14:hiddenLine xmlns:a14="http://schemas.microsoft.com/office/drawing/2010/main" xmlns="" w="9525">
+                <a14:hiddenLine xmlns="" xmlns:a14="http://schemas.microsoft.com/office/drawing/2010/main" w="9525">
                   <a:solidFill>
                     <a:srgbClr val="000000"/>
                   </a:solidFill>
@@ -965,7 +970,7 @@
             </a:ln>
             <a:extLst>
               <a:ext uri="{91240B29-F687-4f45-9708-019B960494DF}">
-                <a14:hiddenLine xmlns:a14="http://schemas.microsoft.com/office/drawing/2010/main" xmlns="" w="9525">
+                <a14:hiddenLine xmlns="" xmlns:a14="http://schemas.microsoft.com/office/drawing/2010/main" w="9525">
                   <a:solidFill>
                     <a:srgbClr val="000000"/>
                   </a:solidFill>
@@ -1055,7 +1060,7 @@
             </a:ln>
             <a:extLst>
               <a:ext uri="{91240B29-F687-4f45-9708-019B960494DF}">
-                <a14:hiddenLine xmlns:a14="http://schemas.microsoft.com/office/drawing/2010/main" xmlns="" w="9525">
+                <a14:hiddenLine xmlns="" xmlns:a14="http://schemas.microsoft.com/office/drawing/2010/main" w="9525">
                   <a:solidFill>
                     <a:srgbClr val="000000"/>
                   </a:solidFill>
@@ -1117,7 +1122,7 @@
             </a:ln>
             <a:extLst>
               <a:ext uri="{91240B29-F687-4f45-9708-019B960494DF}">
-                <a14:hiddenLine xmlns:a14="http://schemas.microsoft.com/office/drawing/2010/main" xmlns="" w="9525">
+                <a14:hiddenLine xmlns="" xmlns:a14="http://schemas.microsoft.com/office/drawing/2010/main" w="9525">
                   <a:solidFill>
                     <a:srgbClr val="000000"/>
                   </a:solidFill>
@@ -1227,7 +1232,7 @@
             </a:ln>
             <a:extLst>
               <a:ext uri="{91240B29-F687-4f45-9708-019B960494DF}">
-                <a14:hiddenLine xmlns:a14="http://schemas.microsoft.com/office/drawing/2010/main" xmlns="" w="9525">
+                <a14:hiddenLine xmlns="" xmlns:a14="http://schemas.microsoft.com/office/drawing/2010/main" w="9525">
                   <a:solidFill>
                     <a:srgbClr val="000000"/>
                   </a:solidFill>
@@ -1289,7 +1294,7 @@
             </a:ln>
             <a:extLst>
               <a:ext uri="{91240B29-F687-4f45-9708-019B960494DF}">
-                <a14:hiddenLine xmlns:a14="http://schemas.microsoft.com/office/drawing/2010/main" xmlns="" w="9525">
+                <a14:hiddenLine xmlns="" xmlns:a14="http://schemas.microsoft.com/office/drawing/2010/main" w="9525">
                   <a:solidFill>
                     <a:srgbClr val="000000"/>
                   </a:solidFill>
@@ -1379,7 +1384,7 @@
             </a:ln>
             <a:extLst>
               <a:ext uri="{91240B29-F687-4f45-9708-019B960494DF}">
-                <a14:hiddenLine xmlns:a14="http://schemas.microsoft.com/office/drawing/2010/main" xmlns="" w="9525">
+                <a14:hiddenLine xmlns="" xmlns:a14="http://schemas.microsoft.com/office/drawing/2010/main" w="9525">
                   <a:solidFill>
                     <a:srgbClr val="000000"/>
                   </a:solidFill>
@@ -1469,7 +1474,7 @@
             </a:ln>
             <a:extLst>
               <a:ext uri="{91240B29-F687-4f45-9708-019B960494DF}">
-                <a14:hiddenLine xmlns:a14="http://schemas.microsoft.com/office/drawing/2010/main" xmlns="" w="9525">
+                <a14:hiddenLine xmlns="" xmlns:a14="http://schemas.microsoft.com/office/drawing/2010/main" w="9525">
                   <a:solidFill>
                     <a:srgbClr val="000000"/>
                   </a:solidFill>
@@ -1531,7 +1536,7 @@
             </a:ln>
             <a:extLst>
               <a:ext uri="{91240B29-F687-4f45-9708-019B960494DF}">
-                <a14:hiddenLine xmlns:a14="http://schemas.microsoft.com/office/drawing/2010/main" xmlns="" w="9525">
+                <a14:hiddenLine xmlns="" xmlns:a14="http://schemas.microsoft.com/office/drawing/2010/main" w="9525">
                   <a:solidFill>
                     <a:srgbClr val="000000"/>
                   </a:solidFill>
@@ -1621,7 +1626,7 @@
             </a:ln>
             <a:extLst>
               <a:ext uri="{91240B29-F687-4f45-9708-019B960494DF}">
-                <a14:hiddenLine xmlns:a14="http://schemas.microsoft.com/office/drawing/2010/main" xmlns="" w="9525">
+                <a14:hiddenLine xmlns="" xmlns:a14="http://schemas.microsoft.com/office/drawing/2010/main" w="9525">
                   <a:solidFill>
                     <a:srgbClr val="000000"/>
                   </a:solidFill>
@@ -1711,7 +1716,7 @@
             </a:ln>
             <a:extLst>
               <a:ext uri="{91240B29-F687-4f45-9708-019B960494DF}">
-                <a14:hiddenLine xmlns:a14="http://schemas.microsoft.com/office/drawing/2010/main" xmlns="" w="9525">
+                <a14:hiddenLine xmlns="" xmlns:a14="http://schemas.microsoft.com/office/drawing/2010/main" w="9525">
                   <a:solidFill>
                     <a:srgbClr val="000000"/>
                   </a:solidFill>
@@ -1767,7 +1772,7 @@
             </a:ln>
             <a:extLst>
               <a:ext uri="{91240B29-F687-4f45-9708-019B960494DF}">
-                <a14:hiddenLine xmlns:a14="http://schemas.microsoft.com/office/drawing/2010/main" xmlns="" w="9525">
+                <a14:hiddenLine xmlns="" xmlns:a14="http://schemas.microsoft.com/office/drawing/2010/main" w="9525">
                   <a:solidFill>
                     <a:srgbClr val="000000"/>
                   </a:solidFill>
@@ -1857,7 +1862,7 @@
             </a:ln>
             <a:extLst>
               <a:ext uri="{91240B29-F687-4f45-9708-019B960494DF}">
-                <a14:hiddenLine xmlns:a14="http://schemas.microsoft.com/office/drawing/2010/main" xmlns="" w="9525">
+                <a14:hiddenLine xmlns="" xmlns:a14="http://schemas.microsoft.com/office/drawing/2010/main" w="9525">
                   <a:solidFill>
                     <a:srgbClr val="000000"/>
                   </a:solidFill>
@@ -1913,7 +1918,7 @@
             </a:ln>
             <a:extLst>
               <a:ext uri="{91240B29-F687-4f45-9708-019B960494DF}">
-                <a14:hiddenLine xmlns:a14="http://schemas.microsoft.com/office/drawing/2010/main" xmlns="" w="9525">
+                <a14:hiddenLine xmlns="" xmlns:a14="http://schemas.microsoft.com/office/drawing/2010/main" w="9525">
                   <a:solidFill>
                     <a:srgbClr val="000000"/>
                   </a:solidFill>
@@ -2003,7 +2008,7 @@
             </a:ln>
             <a:extLst>
               <a:ext uri="{91240B29-F687-4f45-9708-019B960494DF}">
-                <a14:hiddenLine xmlns:a14="http://schemas.microsoft.com/office/drawing/2010/main" xmlns="" w="9525">
+                <a14:hiddenLine xmlns="" xmlns:a14="http://schemas.microsoft.com/office/drawing/2010/main" w="9525">
                   <a:solidFill>
                     <a:srgbClr val="000000"/>
                   </a:solidFill>
@@ -2071,7 +2076,7 @@
             </a:ln>
             <a:extLst>
               <a:ext uri="{91240B29-F687-4f45-9708-019B960494DF}">
-                <a14:hiddenLine xmlns:a14="http://schemas.microsoft.com/office/drawing/2010/main" xmlns="" w="9525">
+                <a14:hiddenLine xmlns="" xmlns:a14="http://schemas.microsoft.com/office/drawing/2010/main" w="9525">
                   <a:solidFill>
                     <a:srgbClr val="000000"/>
                   </a:solidFill>
@@ -2161,7 +2166,7 @@
             </a:ln>
             <a:extLst>
               <a:ext uri="{91240B29-F687-4f45-9708-019B960494DF}">
-                <a14:hiddenLine xmlns:a14="http://schemas.microsoft.com/office/drawing/2010/main" xmlns="" w="9525">
+                <a14:hiddenLine xmlns="" xmlns:a14="http://schemas.microsoft.com/office/drawing/2010/main" w="9525">
                   <a:solidFill>
                     <a:srgbClr val="000000"/>
                   </a:solidFill>
@@ -2229,7 +2234,7 @@
             </a:ln>
             <a:extLst>
               <a:ext uri="{91240B29-F687-4f45-9708-019B960494DF}">
-                <a14:hiddenLine xmlns:a14="http://schemas.microsoft.com/office/drawing/2010/main" xmlns="" w="9525">
+                <a14:hiddenLine xmlns="" xmlns:a14="http://schemas.microsoft.com/office/drawing/2010/main" w="9525">
                   <a:solidFill>
                     <a:srgbClr val="000000"/>
                   </a:solidFill>
@@ -2319,7 +2324,7 @@
             </a:ln>
             <a:extLst>
               <a:ext uri="{91240B29-F687-4f45-9708-019B960494DF}">
-                <a14:hiddenLine xmlns:a14="http://schemas.microsoft.com/office/drawing/2010/main" xmlns="" w="9525">
+                <a14:hiddenLine xmlns="" xmlns:a14="http://schemas.microsoft.com/office/drawing/2010/main" w="9525">
                   <a:solidFill>
                     <a:srgbClr val="000000"/>
                   </a:solidFill>
@@ -2353,7 +2358,7 @@
             </a:ln>
             <a:extLst>
               <a:ext uri="{91240B29-F687-4f45-9708-019B960494DF}">
-                <a14:hiddenLine xmlns:a14="http://schemas.microsoft.com/office/drawing/2010/main" xmlns="" w="9525">
+                <a14:hiddenLine xmlns="" xmlns:a14="http://schemas.microsoft.com/office/drawing/2010/main" w="9525">
                   <a:solidFill>
                     <a:srgbClr val="000000"/>
                   </a:solidFill>
@@ -2443,7 +2448,7 @@
             </a:ln>
             <a:extLst>
               <a:ext uri="{91240B29-F687-4f45-9708-019B960494DF}">
-                <a14:hiddenLine xmlns:a14="http://schemas.microsoft.com/office/drawing/2010/main" xmlns="" w="9525">
+                <a14:hiddenLine xmlns="" xmlns:a14="http://schemas.microsoft.com/office/drawing/2010/main" w="9525">
                   <a:solidFill>
                     <a:srgbClr val="000000"/>
                   </a:solidFill>
@@ -2505,7 +2510,7 @@
             </a:ln>
             <a:extLst>
               <a:ext uri="{91240B29-F687-4f45-9708-019B960494DF}">
-                <a14:hiddenLine xmlns:a14="http://schemas.microsoft.com/office/drawing/2010/main" xmlns="" w="9525">
+                <a14:hiddenLine xmlns="" xmlns:a14="http://schemas.microsoft.com/office/drawing/2010/main" w="9525">
                   <a:solidFill>
                     <a:srgbClr val="000000"/>
                   </a:solidFill>
@@ -2567,7 +2572,7 @@
             </a:ln>
             <a:extLst>
               <a:ext uri="{91240B29-F687-4f45-9708-019B960494DF}">
-                <a14:hiddenLine xmlns:a14="http://schemas.microsoft.com/office/drawing/2010/main" xmlns="" w="9525">
+                <a14:hiddenLine xmlns="" xmlns:a14="http://schemas.microsoft.com/office/drawing/2010/main" w="9525">
                   <a:solidFill>
                     <a:srgbClr val="000000"/>
                   </a:solidFill>
@@ -2657,7 +2662,7 @@
             </a:ln>
             <a:extLst>
               <a:ext uri="{91240B29-F687-4f45-9708-019B960494DF}">
-                <a14:hiddenLine xmlns:a14="http://schemas.microsoft.com/office/drawing/2010/main" xmlns="" w="9525">
+                <a14:hiddenLine xmlns="" xmlns:a14="http://schemas.microsoft.com/office/drawing/2010/main" w="9525">
                   <a:solidFill>
                     <a:srgbClr val="000000"/>
                   </a:solidFill>
@@ -2725,7 +2730,7 @@
             </a:ln>
             <a:extLst>
               <a:ext uri="{91240B29-F687-4f45-9708-019B960494DF}">
-                <a14:hiddenLine xmlns:a14="http://schemas.microsoft.com/office/drawing/2010/main" xmlns="" w="9525">
+                <a14:hiddenLine xmlns="" xmlns:a14="http://schemas.microsoft.com/office/drawing/2010/main" w="9525">
                   <a:solidFill>
                     <a:srgbClr val="000000"/>
                   </a:solidFill>
@@ -2787,7 +2792,7 @@
             </a:ln>
             <a:extLst>
               <a:ext uri="{91240B29-F687-4f45-9708-019B960494DF}">
-                <a14:hiddenLine xmlns:a14="http://schemas.microsoft.com/office/drawing/2010/main" xmlns="" w="9525">
+                <a14:hiddenLine xmlns="" xmlns:a14="http://schemas.microsoft.com/office/drawing/2010/main" w="9525">
                   <a:solidFill>
                     <a:srgbClr val="000000"/>
                   </a:solidFill>
@@ -2877,7 +2882,7 @@
             </a:ln>
             <a:extLst>
               <a:ext uri="{91240B29-F687-4f45-9708-019B960494DF}">
-                <a14:hiddenLine xmlns:a14="http://schemas.microsoft.com/office/drawing/2010/main" xmlns="" w="9525">
+                <a14:hiddenLine xmlns="" xmlns:a14="http://schemas.microsoft.com/office/drawing/2010/main" w="9525">
                   <a:solidFill>
                     <a:srgbClr val="000000"/>
                   </a:solidFill>
@@ -2939,7 +2944,7 @@
             </a:ln>
             <a:extLst>
               <a:ext uri="{91240B29-F687-4f45-9708-019B960494DF}">
-                <a14:hiddenLine xmlns:a14="http://schemas.microsoft.com/office/drawing/2010/main" xmlns="" w="9525">
+                <a14:hiddenLine xmlns="" xmlns:a14="http://schemas.microsoft.com/office/drawing/2010/main" w="9525">
                   <a:solidFill>
                     <a:srgbClr val="000000"/>
                   </a:solidFill>
@@ -3029,7 +3034,7 @@
             </a:ln>
             <a:extLst>
               <a:ext uri="{91240B29-F687-4f45-9708-019B960494DF}">
-                <a14:hiddenLine xmlns:a14="http://schemas.microsoft.com/office/drawing/2010/main" xmlns="" w="9525">
+                <a14:hiddenLine xmlns="" xmlns:a14="http://schemas.microsoft.com/office/drawing/2010/main" w="9525">
                   <a:solidFill>
                     <a:srgbClr val="000000"/>
                   </a:solidFill>
@@ -3091,7 +3096,7 @@
             </a:ln>
             <a:extLst>
               <a:ext uri="{91240B29-F687-4f45-9708-019B960494DF}">
-                <a14:hiddenLine xmlns:a14="http://schemas.microsoft.com/office/drawing/2010/main" xmlns="" w="9525">
+                <a14:hiddenLine xmlns="" xmlns:a14="http://schemas.microsoft.com/office/drawing/2010/main" w="9525">
                   <a:solidFill>
                     <a:srgbClr val="000000"/>
                   </a:solidFill>
@@ -3181,7 +3186,7 @@
             </a:ln>
             <a:extLst>
               <a:ext uri="{91240B29-F687-4f45-9708-019B960494DF}">
-                <a14:hiddenLine xmlns:a14="http://schemas.microsoft.com/office/drawing/2010/main" xmlns="" w="9525">
+                <a14:hiddenLine xmlns="" xmlns:a14="http://schemas.microsoft.com/office/drawing/2010/main" w="9525">
                   <a:solidFill>
                     <a:srgbClr val="000000"/>
                   </a:solidFill>
@@ -3215,7 +3220,7 @@
             </a:ln>
             <a:extLst>
               <a:ext uri="{91240B29-F687-4f45-9708-019B960494DF}">
-                <a14:hiddenLine xmlns:a14="http://schemas.microsoft.com/office/drawing/2010/main" xmlns="" w="9525">
+                <a14:hiddenLine xmlns="" xmlns:a14="http://schemas.microsoft.com/office/drawing/2010/main" w="9525">
                   <a:solidFill>
                     <a:srgbClr val="000000"/>
                   </a:solidFill>
@@ -3280,7 +3285,7 @@
             </a:ln>
             <a:extLst>
               <a:ext uri="{91240B29-F687-4f45-9708-019B960494DF}">
-                <a14:hiddenLine xmlns:a14="http://schemas.microsoft.com/office/drawing/2010/main" xmlns="" w="9525">
+                <a14:hiddenLine xmlns="" xmlns:a14="http://schemas.microsoft.com/office/drawing/2010/main" w="9525">
                   <a:solidFill>
                     <a:srgbClr val="000000"/>
                   </a:solidFill>
@@ -3370,7 +3375,7 @@
             </a:ln>
             <a:extLst>
               <a:ext uri="{91240B29-F687-4f45-9708-019B960494DF}">
-                <a14:hiddenLine xmlns:a14="http://schemas.microsoft.com/office/drawing/2010/main" xmlns="" w="9525">
+                <a14:hiddenLine xmlns="" xmlns:a14="http://schemas.microsoft.com/office/drawing/2010/main" w="9525">
                   <a:solidFill>
                     <a:srgbClr val="000000"/>
                   </a:solidFill>
@@ -3432,7 +3437,7 @@
             </a:ln>
             <a:extLst>
               <a:ext uri="{91240B29-F687-4f45-9708-019B960494DF}">
-                <a14:hiddenLine xmlns:a14="http://schemas.microsoft.com/office/drawing/2010/main" xmlns="" w="9525">
+                <a14:hiddenLine xmlns="" xmlns:a14="http://schemas.microsoft.com/office/drawing/2010/main" w="9525">
                   <a:solidFill>
                     <a:srgbClr val="000000"/>
                   </a:solidFill>
@@ -3522,7 +3527,7 @@
             </a:ln>
             <a:extLst>
               <a:ext uri="{91240B29-F687-4f45-9708-019B960494DF}">
-                <a14:hiddenLine xmlns:a14="http://schemas.microsoft.com/office/drawing/2010/main" xmlns="" w="9525">
+                <a14:hiddenLine xmlns="" xmlns:a14="http://schemas.microsoft.com/office/drawing/2010/main" w="9525">
                   <a:solidFill>
                     <a:srgbClr val="000000"/>
                   </a:solidFill>
@@ -3612,7 +3617,7 @@
             </a:ln>
             <a:extLst>
               <a:ext uri="{91240B29-F687-4f45-9708-019B960494DF}">
-                <a14:hiddenLine xmlns:a14="http://schemas.microsoft.com/office/drawing/2010/main" xmlns="" w="9525">
+                <a14:hiddenLine xmlns="" xmlns:a14="http://schemas.microsoft.com/office/drawing/2010/main" w="9525">
                   <a:solidFill>
                     <a:srgbClr val="000000"/>
                   </a:solidFill>
@@ -3677,7 +3682,7 @@
             </a:ln>
             <a:extLst>
               <a:ext uri="{91240B29-F687-4f45-9708-019B960494DF}">
-                <a14:hiddenLine xmlns:a14="http://schemas.microsoft.com/office/drawing/2010/main" xmlns="" w="9525">
+                <a14:hiddenLine xmlns="" xmlns:a14="http://schemas.microsoft.com/office/drawing/2010/main" w="9525">
                   <a:solidFill>
                     <a:srgbClr val="000000"/>
                   </a:solidFill>
@@ -3739,7 +3744,7 @@
             </a:ln>
             <a:extLst>
               <a:ext uri="{91240B29-F687-4f45-9708-019B960494DF}">
-                <a14:hiddenLine xmlns:a14="http://schemas.microsoft.com/office/drawing/2010/main" xmlns="" w="9525">
+                <a14:hiddenLine xmlns="" xmlns:a14="http://schemas.microsoft.com/office/drawing/2010/main" w="9525">
                   <a:solidFill>
                     <a:srgbClr val="000000"/>
                   </a:solidFill>
@@ -3829,7 +3834,7 @@
             </a:ln>
             <a:extLst>
               <a:ext uri="{91240B29-F687-4f45-9708-019B960494DF}">
-                <a14:hiddenLine xmlns:a14="http://schemas.microsoft.com/office/drawing/2010/main" xmlns="" w="9525">
+                <a14:hiddenLine xmlns="" xmlns:a14="http://schemas.microsoft.com/office/drawing/2010/main" w="9525">
                   <a:solidFill>
                     <a:srgbClr val="000000"/>
                   </a:solidFill>
@@ -3919,7 +3924,7 @@
             </a:ln>
             <a:extLst>
               <a:ext uri="{91240B29-F687-4f45-9708-019B960494DF}">
-                <a14:hiddenLine xmlns:a14="http://schemas.microsoft.com/office/drawing/2010/main" xmlns="" w="9525">
+                <a14:hiddenLine xmlns="" xmlns:a14="http://schemas.microsoft.com/office/drawing/2010/main" w="9525">
                   <a:solidFill>
                     <a:srgbClr val="000000"/>
                   </a:solidFill>
@@ -3981,7 +3986,7 @@
             </a:ln>
             <a:extLst>
               <a:ext uri="{91240B29-F687-4f45-9708-019B960494DF}">
-                <a14:hiddenLine xmlns:a14="http://schemas.microsoft.com/office/drawing/2010/main" xmlns="" w="9525">
+                <a14:hiddenLine xmlns="" xmlns:a14="http://schemas.microsoft.com/office/drawing/2010/main" w="9525">
                   <a:solidFill>
                     <a:srgbClr val="000000"/>
                   </a:solidFill>
@@ -4101,7 +4106,7 @@
             </a:ln>
             <a:extLst>
               <a:ext uri="{91240B29-F687-4f45-9708-019B960494DF}">
-                <a14:hiddenLine xmlns:a14="http://schemas.microsoft.com/office/drawing/2010/main" xmlns="" w="9525">
+                <a14:hiddenLine xmlns="" xmlns:a14="http://schemas.microsoft.com/office/drawing/2010/main" w="9525">
                   <a:solidFill>
                     <a:srgbClr val="000000"/>
                   </a:solidFill>
@@ -4169,7 +4174,7 @@
             </a:ln>
             <a:extLst>
               <a:ext uri="{91240B29-F687-4f45-9708-019B960494DF}">
-                <a14:hiddenLine xmlns:a14="http://schemas.microsoft.com/office/drawing/2010/main" xmlns="" w="9525">
+                <a14:hiddenLine xmlns="" xmlns:a14="http://schemas.microsoft.com/office/drawing/2010/main" w="9525">
                   <a:solidFill>
                     <a:srgbClr val="000000"/>
                   </a:solidFill>
@@ -4259,7 +4264,7 @@
             </a:ln>
             <a:extLst>
               <a:ext uri="{91240B29-F687-4f45-9708-019B960494DF}">
-                <a14:hiddenLine xmlns:a14="http://schemas.microsoft.com/office/drawing/2010/main" xmlns="" w="9525">
+                <a14:hiddenLine xmlns="" xmlns:a14="http://schemas.microsoft.com/office/drawing/2010/main" w="9525">
                   <a:solidFill>
                     <a:srgbClr val="000000"/>
                   </a:solidFill>
@@ -4399,7 +4404,7 @@
           <a:p>
             <a:fld id="{48A87A34-81AB-432B-8DAE-1953F412C126}" type="datetimeFigureOut">
               <a:rPr lang="en-US" dirty="0"/>
-              <a:t>12/6/2013</a:t>
+              <a:t>12/7/2013</a:t>
             </a:fld>
             <a:endParaRPr lang="en-US" dirty="0"/>
           </a:p>
@@ -4661,7 +4666,7 @@
           <a:p>
             <a:fld id="{48A87A34-81AB-432B-8DAE-1953F412C126}" type="datetimeFigureOut">
               <a:rPr lang="en-US" dirty="0"/>
-              <a:t>12/6/2013</a:t>
+              <a:t>12/7/2013</a:t>
             </a:fld>
             <a:endParaRPr lang="en-US" dirty="0"/>
           </a:p>
@@ -4852,7 +4857,7 @@
           <a:p>
             <a:fld id="{48A87A34-81AB-432B-8DAE-1953F412C126}" type="datetimeFigureOut">
               <a:rPr lang="en-US" dirty="0"/>
-              <a:t>12/6/2013</a:t>
+              <a:t>12/7/2013</a:t>
             </a:fld>
             <a:endParaRPr lang="en-US" dirty="0"/>
           </a:p>
@@ -5110,7 +5115,7 @@
           <a:p>
             <a:fld id="{48A87A34-81AB-432B-8DAE-1953F412C126}" type="datetimeFigureOut">
               <a:rPr lang="en-US" dirty="0"/>
-              <a:t>12/6/2013</a:t>
+              <a:t>12/7/2013</a:t>
             </a:fld>
             <a:endParaRPr lang="en-US" dirty="0"/>
           </a:p>
@@ -5539,7 +5544,7 @@
           <a:p>
             <a:fld id="{48A87A34-81AB-432B-8DAE-1953F412C126}" type="datetimeFigureOut">
               <a:rPr lang="en-US" dirty="0"/>
-              <a:t>12/6/2013</a:t>
+              <a:t>12/7/2013</a:t>
             </a:fld>
             <a:endParaRPr lang="en-US" dirty="0"/>
           </a:p>
@@ -6080,7 +6085,7 @@
           <a:p>
             <a:fld id="{48A87A34-81AB-432B-8DAE-1953F412C126}" type="datetimeFigureOut">
               <a:rPr lang="en-US" dirty="0"/>
-              <a:t>12/6/2013</a:t>
+              <a:t>12/7/2013</a:t>
             </a:fld>
             <a:endParaRPr lang="en-US" dirty="0"/>
           </a:p>
@@ -6795,7 +6800,7 @@
           <a:p>
             <a:fld id="{48A87A34-81AB-432B-8DAE-1953F412C126}" type="datetimeFigureOut">
               <a:rPr lang="en-US" dirty="0"/>
-              <a:t>12/6/2013</a:t>
+              <a:t>12/7/2013</a:t>
             </a:fld>
             <a:endParaRPr lang="en-US" dirty="0"/>
           </a:p>
@@ -6960,7 +6965,7 @@
           <a:p>
             <a:fld id="{48A87A34-81AB-432B-8DAE-1953F412C126}" type="datetimeFigureOut">
               <a:rPr lang="en-US" dirty="0"/>
-              <a:t>12/6/2013</a:t>
+              <a:t>12/7/2013</a:t>
             </a:fld>
             <a:endParaRPr lang="en-US" dirty="0"/>
           </a:p>
@@ -7135,7 +7140,7 @@
           <a:p>
             <a:fld id="{48A87A34-81AB-432B-8DAE-1953F412C126}" type="datetimeFigureOut">
               <a:rPr lang="en-US" dirty="0"/>
-              <a:t>12/6/2013</a:t>
+              <a:t>12/7/2013</a:t>
             </a:fld>
             <a:endParaRPr lang="en-US" dirty="0"/>
           </a:p>
@@ -7300,7 +7305,7 @@
           <a:p>
             <a:fld id="{48A87A34-81AB-432B-8DAE-1953F412C126}" type="datetimeFigureOut">
               <a:rPr lang="en-US" dirty="0"/>
-              <a:t>12/6/2013</a:t>
+              <a:t>12/7/2013</a:t>
             </a:fld>
             <a:endParaRPr lang="en-US" dirty="0"/>
           </a:p>
@@ -7545,7 +7550,7 @@
           <a:p>
             <a:fld id="{48A87A34-81AB-432B-8DAE-1953F412C126}" type="datetimeFigureOut">
               <a:rPr lang="en-US" dirty="0"/>
-              <a:t>12/6/2013</a:t>
+              <a:t>12/7/2013</a:t>
             </a:fld>
             <a:endParaRPr lang="en-US" dirty="0"/>
           </a:p>
@@ -7772,7 +7777,7 @@
           <a:p>
             <a:fld id="{48A87A34-81AB-432B-8DAE-1953F412C126}" type="datetimeFigureOut">
               <a:rPr lang="en-US" dirty="0"/>
-              <a:t>12/6/2013</a:t>
+              <a:t>12/7/2013</a:t>
             </a:fld>
             <a:endParaRPr lang="en-US" dirty="0"/>
           </a:p>
@@ -8148,7 +8153,7 @@
           <a:p>
             <a:fld id="{48A87A34-81AB-432B-8DAE-1953F412C126}" type="datetimeFigureOut">
               <a:rPr lang="en-US" dirty="0"/>
-              <a:t>12/6/2013</a:t>
+              <a:t>12/7/2013</a:t>
             </a:fld>
             <a:endParaRPr lang="en-US" dirty="0"/>
           </a:p>
@@ -8261,7 +8266,7 @@
           <a:p>
             <a:fld id="{48A87A34-81AB-432B-8DAE-1953F412C126}" type="datetimeFigureOut">
               <a:rPr lang="en-US" dirty="0"/>
-              <a:t>12/6/2013</a:t>
+              <a:t>12/7/2013</a:t>
             </a:fld>
             <a:endParaRPr lang="en-US" dirty="0"/>
           </a:p>
@@ -8351,7 +8356,7 @@
           <a:p>
             <a:fld id="{48A87A34-81AB-432B-8DAE-1953F412C126}" type="datetimeFigureOut">
               <a:rPr lang="en-US" dirty="0"/>
-              <a:t>12/6/2013</a:t>
+              <a:t>12/7/2013</a:t>
             </a:fld>
             <a:endParaRPr lang="en-US" dirty="0"/>
           </a:p>
@@ -8595,7 +8600,7 @@
           <a:p>
             <a:fld id="{48A87A34-81AB-432B-8DAE-1953F412C126}" type="datetimeFigureOut">
               <a:rPr lang="en-US" dirty="0"/>
-              <a:t>12/6/2013</a:t>
+              <a:t>12/7/2013</a:t>
             </a:fld>
             <a:endParaRPr lang="en-US" dirty="0"/>
           </a:p>
@@ -8870,7 +8875,7 @@
           <a:p>
             <a:fld id="{48A87A34-81AB-432B-8DAE-1953F412C126}" type="datetimeFigureOut">
               <a:rPr lang="en-US" dirty="0"/>
-              <a:t>12/6/2013</a:t>
+              <a:t>12/7/2013</a:t>
             </a:fld>
             <a:endParaRPr lang="en-US" dirty="0"/>
           </a:p>
@@ -8988,7 +8993,7 @@
           <a:noFill/>
           <a:extLst>
             <a:ext uri="{909E8E84-426E-40dd-AFC4-6F175D3DCCD1}">
-              <a14:hiddenFill xmlns:a14="http://schemas.microsoft.com/office/drawing/2010/main" xmlns="">
+              <a14:hiddenFill xmlns="" xmlns:a14="http://schemas.microsoft.com/office/drawing/2010/main">
                 <a:solidFill>
                   <a:srgbClr val="FFFFFF"/>
                 </a:solidFill>
@@ -9062,7 +9067,7 @@
               </a:ln>
               <a:extLst>
                 <a:ext uri="{91240B29-F687-4f45-9708-019B960494DF}">
-                  <a14:hiddenLine xmlns:a14="http://schemas.microsoft.com/office/drawing/2010/main" xmlns="" w="9525">
+                  <a14:hiddenLine xmlns="" xmlns:a14="http://schemas.microsoft.com/office/drawing/2010/main" w="9525">
                     <a:solidFill>
                       <a:srgbClr val="000000"/>
                     </a:solidFill>
@@ -9152,7 +9157,7 @@
               </a:ln>
               <a:extLst>
                 <a:ext uri="{91240B29-F687-4f45-9708-019B960494DF}">
-                  <a14:hiddenLine xmlns:a14="http://schemas.microsoft.com/office/drawing/2010/main" xmlns="" w="9525">
+                  <a14:hiddenLine xmlns="" xmlns:a14="http://schemas.microsoft.com/office/drawing/2010/main" w="9525">
                     <a:solidFill>
                       <a:srgbClr val="000000"/>
                     </a:solidFill>
@@ -9242,7 +9247,7 @@
               </a:ln>
               <a:extLst>
                 <a:ext uri="{91240B29-F687-4f45-9708-019B960494DF}">
-                  <a14:hiddenLine xmlns:a14="http://schemas.microsoft.com/office/drawing/2010/main" xmlns="" w="9525">
+                  <a14:hiddenLine xmlns="" xmlns:a14="http://schemas.microsoft.com/office/drawing/2010/main" w="9525">
                     <a:solidFill>
                       <a:srgbClr val="000000"/>
                     </a:solidFill>
@@ -9304,7 +9309,7 @@
               </a:ln>
               <a:extLst>
                 <a:ext uri="{91240B29-F687-4f45-9708-019B960494DF}">
-                  <a14:hiddenLine xmlns:a14="http://schemas.microsoft.com/office/drawing/2010/main" xmlns="" w="9525">
+                  <a14:hiddenLine xmlns="" xmlns:a14="http://schemas.microsoft.com/office/drawing/2010/main" w="9525">
                     <a:solidFill>
                       <a:srgbClr val="000000"/>
                     </a:solidFill>
@@ -9394,7 +9399,7 @@
               </a:ln>
               <a:extLst>
                 <a:ext uri="{91240B29-F687-4f45-9708-019B960494DF}">
-                  <a14:hiddenLine xmlns:a14="http://schemas.microsoft.com/office/drawing/2010/main" xmlns="" w="9525">
+                  <a14:hiddenLine xmlns="" xmlns:a14="http://schemas.microsoft.com/office/drawing/2010/main" w="9525">
                     <a:solidFill>
                       <a:srgbClr val="000000"/>
                     </a:solidFill>
@@ -9456,7 +9461,7 @@
               </a:ln>
               <a:extLst>
                 <a:ext uri="{91240B29-F687-4f45-9708-019B960494DF}">
-                  <a14:hiddenLine xmlns:a14="http://schemas.microsoft.com/office/drawing/2010/main" xmlns="" w="9525">
+                  <a14:hiddenLine xmlns="" xmlns:a14="http://schemas.microsoft.com/office/drawing/2010/main" w="9525">
                     <a:solidFill>
                       <a:srgbClr val="000000"/>
                     </a:solidFill>
@@ -9518,7 +9523,7 @@
               </a:ln>
               <a:extLst>
                 <a:ext uri="{91240B29-F687-4f45-9708-019B960494DF}">
-                  <a14:hiddenLine xmlns:a14="http://schemas.microsoft.com/office/drawing/2010/main" xmlns="" w="9525">
+                  <a14:hiddenLine xmlns="" xmlns:a14="http://schemas.microsoft.com/office/drawing/2010/main" w="9525">
                     <a:solidFill>
                       <a:srgbClr val="000000"/>
                     </a:solidFill>
@@ -9608,7 +9613,7 @@
               </a:ln>
               <a:extLst>
                 <a:ext uri="{91240B29-F687-4f45-9708-019B960494DF}">
-                  <a14:hiddenLine xmlns:a14="http://schemas.microsoft.com/office/drawing/2010/main" xmlns="" w="9525">
+                  <a14:hiddenLine xmlns="" xmlns:a14="http://schemas.microsoft.com/office/drawing/2010/main" w="9525">
                     <a:solidFill>
                       <a:srgbClr val="000000"/>
                     </a:solidFill>
@@ -9698,7 +9703,7 @@
               </a:ln>
               <a:extLst>
                 <a:ext uri="{91240B29-F687-4f45-9708-019B960494DF}">
-                  <a14:hiddenLine xmlns:a14="http://schemas.microsoft.com/office/drawing/2010/main" xmlns="" w="9525">
+                  <a14:hiddenLine xmlns="" xmlns:a14="http://schemas.microsoft.com/office/drawing/2010/main" w="9525">
                     <a:solidFill>
                       <a:srgbClr val="000000"/>
                     </a:solidFill>
@@ -9760,7 +9765,7 @@
               </a:ln>
               <a:extLst>
                 <a:ext uri="{91240B29-F687-4f45-9708-019B960494DF}">
-                  <a14:hiddenLine xmlns:a14="http://schemas.microsoft.com/office/drawing/2010/main" xmlns="" w="9525">
+                  <a14:hiddenLine xmlns="" xmlns:a14="http://schemas.microsoft.com/office/drawing/2010/main" w="9525">
                     <a:solidFill>
                       <a:srgbClr val="000000"/>
                     </a:solidFill>
@@ -9870,7 +9875,7 @@
               </a:ln>
               <a:extLst>
                 <a:ext uri="{91240B29-F687-4f45-9708-019B960494DF}">
-                  <a14:hiddenLine xmlns:a14="http://schemas.microsoft.com/office/drawing/2010/main" xmlns="" w="9525">
+                  <a14:hiddenLine xmlns="" xmlns:a14="http://schemas.microsoft.com/office/drawing/2010/main" w="9525">
                     <a:solidFill>
                       <a:srgbClr val="000000"/>
                     </a:solidFill>
@@ -9954,7 +9959,7 @@
               </a:ln>
               <a:extLst>
                 <a:ext uri="{91240B29-F687-4f45-9708-019B960494DF}">
-                  <a14:hiddenLine xmlns:a14="http://schemas.microsoft.com/office/drawing/2010/main" xmlns="" w="9525">
+                  <a14:hiddenLine xmlns="" xmlns:a14="http://schemas.microsoft.com/office/drawing/2010/main" w="9525">
                     <a:solidFill>
                       <a:srgbClr val="000000"/>
                     </a:solidFill>
@@ -10016,7 +10021,7 @@
               </a:ln>
               <a:extLst>
                 <a:ext uri="{91240B29-F687-4f45-9708-019B960494DF}">
-                  <a14:hiddenLine xmlns:a14="http://schemas.microsoft.com/office/drawing/2010/main" xmlns="" w="9525">
+                  <a14:hiddenLine xmlns="" xmlns:a14="http://schemas.microsoft.com/office/drawing/2010/main" w="9525">
                     <a:solidFill>
                       <a:srgbClr val="000000"/>
                     </a:solidFill>
@@ -10078,7 +10083,7 @@
               </a:ln>
               <a:extLst>
                 <a:ext uri="{91240B29-F687-4f45-9708-019B960494DF}">
-                  <a14:hiddenLine xmlns:a14="http://schemas.microsoft.com/office/drawing/2010/main" xmlns="" w="9525">
+                  <a14:hiddenLine xmlns="" xmlns:a14="http://schemas.microsoft.com/office/drawing/2010/main" w="9525">
                     <a:solidFill>
                       <a:srgbClr val="000000"/>
                     </a:solidFill>
@@ -10168,7 +10173,7 @@
               </a:ln>
               <a:extLst>
                 <a:ext uri="{91240B29-F687-4f45-9708-019B960494DF}">
-                  <a14:hiddenLine xmlns:a14="http://schemas.microsoft.com/office/drawing/2010/main" xmlns="" w="9525">
+                  <a14:hiddenLine xmlns="" xmlns:a14="http://schemas.microsoft.com/office/drawing/2010/main" w="9525">
                     <a:solidFill>
                       <a:srgbClr val="000000"/>
                     </a:solidFill>
@@ -10202,7 +10207,7 @@
               </a:ln>
               <a:extLst>
                 <a:ext uri="{91240B29-F687-4f45-9708-019B960494DF}">
-                  <a14:hiddenLine xmlns:a14="http://schemas.microsoft.com/office/drawing/2010/main" xmlns="" w="9525">
+                  <a14:hiddenLine xmlns="" xmlns:a14="http://schemas.microsoft.com/office/drawing/2010/main" w="9525">
                     <a:solidFill>
                       <a:srgbClr val="000000"/>
                     </a:solidFill>
@@ -10267,7 +10272,7 @@
               </a:ln>
               <a:extLst>
                 <a:ext uri="{91240B29-F687-4f45-9708-019B960494DF}">
-                  <a14:hiddenLine xmlns:a14="http://schemas.microsoft.com/office/drawing/2010/main" xmlns="" w="9525">
+                  <a14:hiddenLine xmlns="" xmlns:a14="http://schemas.microsoft.com/office/drawing/2010/main" w="9525">
                     <a:solidFill>
                       <a:srgbClr val="000000"/>
                     </a:solidFill>
@@ -10357,7 +10362,7 @@
               </a:ln>
               <a:extLst>
                 <a:ext uri="{91240B29-F687-4f45-9708-019B960494DF}">
-                  <a14:hiddenLine xmlns:a14="http://schemas.microsoft.com/office/drawing/2010/main" xmlns="" w="9525">
+                  <a14:hiddenLine xmlns="" xmlns:a14="http://schemas.microsoft.com/office/drawing/2010/main" w="9525">
                     <a:solidFill>
                       <a:srgbClr val="000000"/>
                     </a:solidFill>
@@ -10419,7 +10424,7 @@
               </a:ln>
               <a:extLst>
                 <a:ext uri="{91240B29-F687-4f45-9708-019B960494DF}">
-                  <a14:hiddenLine xmlns:a14="http://schemas.microsoft.com/office/drawing/2010/main" xmlns="" w="9525">
+                  <a14:hiddenLine xmlns="" xmlns:a14="http://schemas.microsoft.com/office/drawing/2010/main" w="9525">
                     <a:solidFill>
                       <a:srgbClr val="000000"/>
                     </a:solidFill>
@@ -10509,7 +10514,7 @@
               </a:ln>
               <a:extLst>
                 <a:ext uri="{91240B29-F687-4f45-9708-019B960494DF}">
-                  <a14:hiddenLine xmlns:a14="http://schemas.microsoft.com/office/drawing/2010/main" xmlns="" w="9525">
+                  <a14:hiddenLine xmlns="" xmlns:a14="http://schemas.microsoft.com/office/drawing/2010/main" w="9525">
                     <a:solidFill>
                       <a:srgbClr val="000000"/>
                     </a:solidFill>
@@ -10574,7 +10579,7 @@
               </a:ln>
               <a:extLst>
                 <a:ext uri="{91240B29-F687-4f45-9708-019B960494DF}">
-                  <a14:hiddenLine xmlns:a14="http://schemas.microsoft.com/office/drawing/2010/main" xmlns="" w="9525">
+                  <a14:hiddenLine xmlns="" xmlns:a14="http://schemas.microsoft.com/office/drawing/2010/main" w="9525">
                     <a:solidFill>
                       <a:srgbClr val="000000"/>
                     </a:solidFill>
@@ -10636,7 +10641,7 @@
               </a:ln>
               <a:extLst>
                 <a:ext uri="{91240B29-F687-4f45-9708-019B960494DF}">
-                  <a14:hiddenLine xmlns:a14="http://schemas.microsoft.com/office/drawing/2010/main" xmlns="" w="9525">
+                  <a14:hiddenLine xmlns="" xmlns:a14="http://schemas.microsoft.com/office/drawing/2010/main" w="9525">
                     <a:solidFill>
                       <a:srgbClr val="000000"/>
                     </a:solidFill>
@@ -10726,7 +10731,7 @@
               </a:ln>
               <a:extLst>
                 <a:ext uri="{91240B29-F687-4f45-9708-019B960494DF}">
-                  <a14:hiddenLine xmlns:a14="http://schemas.microsoft.com/office/drawing/2010/main" xmlns="" w="9525">
+                  <a14:hiddenLine xmlns="" xmlns:a14="http://schemas.microsoft.com/office/drawing/2010/main" w="9525">
                     <a:solidFill>
                       <a:srgbClr val="000000"/>
                     </a:solidFill>
@@ -10816,7 +10821,7 @@
               </a:ln>
               <a:extLst>
                 <a:ext uri="{91240B29-F687-4f45-9708-019B960494DF}">
-                  <a14:hiddenLine xmlns:a14="http://schemas.microsoft.com/office/drawing/2010/main" xmlns="" w="9525">
+                  <a14:hiddenLine xmlns="" xmlns:a14="http://schemas.microsoft.com/office/drawing/2010/main" w="9525">
                     <a:solidFill>
                       <a:srgbClr val="000000"/>
                     </a:solidFill>
@@ -10881,7 +10886,7 @@
               </a:ln>
               <a:extLst>
                 <a:ext uri="{91240B29-F687-4f45-9708-019B960494DF}">
-                  <a14:hiddenLine xmlns:a14="http://schemas.microsoft.com/office/drawing/2010/main" xmlns="" w="9525">
+                  <a14:hiddenLine xmlns="" xmlns:a14="http://schemas.microsoft.com/office/drawing/2010/main" w="9525">
                     <a:solidFill>
                       <a:srgbClr val="000000"/>
                     </a:solidFill>
@@ -11001,7 +11006,7 @@
               </a:ln>
               <a:extLst>
                 <a:ext uri="{91240B29-F687-4f45-9708-019B960494DF}">
-                  <a14:hiddenLine xmlns:a14="http://schemas.microsoft.com/office/drawing/2010/main" xmlns="" w="9525">
+                  <a14:hiddenLine xmlns="" xmlns:a14="http://schemas.microsoft.com/office/drawing/2010/main" w="9525">
                     <a:solidFill>
                       <a:srgbClr val="000000"/>
                     </a:solidFill>
@@ -11082,7 +11087,7 @@
               </a:ln>
               <a:extLst>
                 <a:ext uri="{91240B29-F687-4f45-9708-019B960494DF}">
-                  <a14:hiddenLine xmlns:a14="http://schemas.microsoft.com/office/drawing/2010/main" xmlns="" w="9525">
+                  <a14:hiddenLine xmlns="" xmlns:a14="http://schemas.microsoft.com/office/drawing/2010/main" w="9525">
                     <a:solidFill>
                       <a:srgbClr val="000000"/>
                     </a:solidFill>
@@ -11197,7 +11202,7 @@
               </a:ln>
               <a:extLst>
                 <a:ext uri="{91240B29-F687-4f45-9708-019B960494DF}">
-                  <a14:hiddenLine xmlns:a14="http://schemas.microsoft.com/office/drawing/2010/main" xmlns="" w="9525">
+                  <a14:hiddenLine xmlns="" xmlns:a14="http://schemas.microsoft.com/office/drawing/2010/main" w="9525">
                     <a:solidFill>
                       <a:srgbClr val="000000"/>
                     </a:solidFill>
@@ -11287,7 +11292,7 @@
               </a:ln>
               <a:extLst>
                 <a:ext uri="{91240B29-F687-4f45-9708-019B960494DF}">
-                  <a14:hiddenLine xmlns:a14="http://schemas.microsoft.com/office/drawing/2010/main" xmlns="" w="9525">
+                  <a14:hiddenLine xmlns="" xmlns:a14="http://schemas.microsoft.com/office/drawing/2010/main" w="9525">
                     <a:solidFill>
                       <a:srgbClr val="000000"/>
                     </a:solidFill>
@@ -11352,7 +11357,7 @@
               </a:ln>
               <a:extLst>
                 <a:ext uri="{91240B29-F687-4f45-9708-019B960494DF}">
-                  <a14:hiddenLine xmlns:a14="http://schemas.microsoft.com/office/drawing/2010/main" xmlns="" w="9525">
+                  <a14:hiddenLine xmlns="" xmlns:a14="http://schemas.microsoft.com/office/drawing/2010/main" w="9525">
                     <a:solidFill>
                       <a:srgbClr val="000000"/>
                     </a:solidFill>
@@ -11442,7 +11447,7 @@
               </a:ln>
               <a:extLst>
                 <a:ext uri="{91240B29-F687-4f45-9708-019B960494DF}">
-                  <a14:hiddenLine xmlns:a14="http://schemas.microsoft.com/office/drawing/2010/main" xmlns="" w="9525">
+                  <a14:hiddenLine xmlns="" xmlns:a14="http://schemas.microsoft.com/office/drawing/2010/main" w="9525">
                     <a:solidFill>
                       <a:srgbClr val="000000"/>
                     </a:solidFill>
@@ -11510,7 +11515,7 @@
               </a:ln>
               <a:extLst>
                 <a:ext uri="{91240B29-F687-4f45-9708-019B960494DF}">
-                  <a14:hiddenLine xmlns:a14="http://schemas.microsoft.com/office/drawing/2010/main" xmlns="" w="9525">
+                  <a14:hiddenLine xmlns="" xmlns:a14="http://schemas.microsoft.com/office/drawing/2010/main" w="9525">
                     <a:solidFill>
                       <a:srgbClr val="000000"/>
                     </a:solidFill>
@@ -11600,7 +11605,7 @@
               </a:ln>
               <a:extLst>
                 <a:ext uri="{91240B29-F687-4f45-9708-019B960494DF}">
-                  <a14:hiddenLine xmlns:a14="http://schemas.microsoft.com/office/drawing/2010/main" xmlns="" w="9525">
+                  <a14:hiddenLine xmlns="" xmlns:a14="http://schemas.microsoft.com/office/drawing/2010/main" w="9525">
                     <a:solidFill>
                       <a:srgbClr val="000000"/>
                     </a:solidFill>
@@ -11668,7 +11673,7 @@
               </a:ln>
               <a:extLst>
                 <a:ext uri="{91240B29-F687-4f45-9708-019B960494DF}">
-                  <a14:hiddenLine xmlns:a14="http://schemas.microsoft.com/office/drawing/2010/main" xmlns="" w="9525">
+                  <a14:hiddenLine xmlns="" xmlns:a14="http://schemas.microsoft.com/office/drawing/2010/main" w="9525">
                     <a:solidFill>
                       <a:srgbClr val="000000"/>
                     </a:solidFill>
@@ -11758,7 +11763,7 @@
               </a:ln>
               <a:extLst>
                 <a:ext uri="{91240B29-F687-4f45-9708-019B960494DF}">
-                  <a14:hiddenLine xmlns:a14="http://schemas.microsoft.com/office/drawing/2010/main" xmlns="" w="9525">
+                  <a14:hiddenLine xmlns="" xmlns:a14="http://schemas.microsoft.com/office/drawing/2010/main" w="9525">
                     <a:solidFill>
                       <a:srgbClr val="000000"/>
                     </a:solidFill>
@@ -11792,7 +11797,7 @@
               </a:ln>
               <a:extLst>
                 <a:ext uri="{91240B29-F687-4f45-9708-019B960494DF}">
-                  <a14:hiddenLine xmlns:a14="http://schemas.microsoft.com/office/drawing/2010/main" xmlns="" w="9525">
+                  <a14:hiddenLine xmlns="" xmlns:a14="http://schemas.microsoft.com/office/drawing/2010/main" w="9525">
                     <a:solidFill>
                       <a:srgbClr val="000000"/>
                     </a:solidFill>
@@ -11933,7 +11938,7 @@
             <a:fld id="{48A87A34-81AB-432B-8DAE-1953F412C126}" type="datetimeFigureOut">
               <a:rPr lang="en-US" dirty="0"/>
               <a:pPr/>
-              <a:t>12/6/2013</a:t>
+              <a:t>12/7/2013</a:t>
             </a:fld>
             <a:endParaRPr lang="en-US" dirty="0"/>
           </a:p>
@@ -12502,7 +12507,31 @@
           <a:bodyPr/>
           <a:lstStyle/>
           <a:p>
-            <a:endParaRPr lang="en-US"/>
+            <a:r>
+              <a:rPr lang="en-US" dirty="0" smtClean="0"/>
+              <a:t>Add parameter box in robot theater for people to be able to control Nixon Bohr</a:t>
+            </a:r>
+          </a:p>
+          <a:p>
+            <a:r>
+              <a:rPr lang="en-US" dirty="0" smtClean="0"/>
+              <a:t>Add vision</a:t>
+            </a:r>
+          </a:p>
+          <a:p>
+            <a:r>
+              <a:rPr lang="en-US" dirty="0" smtClean="0"/>
+              <a:t>Move arm to shoulder and add another</a:t>
+            </a:r>
+          </a:p>
+          <a:p>
+            <a:r>
+              <a:rPr lang="en-US" dirty="0" smtClean="0"/>
+              <a:t>Add emotion with IGA</a:t>
+            </a:r>
+          </a:p>
+          <a:p>
+            <a:endParaRPr lang="en-US" dirty="0"/>
           </a:p>
         </p:txBody>
       </p:sp>
@@ -12670,8 +12699,13 @@
             </a:r>
             <a:r>
               <a:rPr lang="en-US" dirty="0"/>
-              <a:t>of a masters thesis project. </a:t>
+              <a:t>of a masters thesis </a:t>
             </a:r>
+            <a:r>
+              <a:rPr lang="en-US" dirty="0" smtClean="0"/>
+              <a:t>project involving a Kinect and LEGO NXT brick. </a:t>
+            </a:r>
+            <a:endParaRPr lang="en-US" dirty="0"/>
           </a:p>
           <a:p>
             <a:pPr marL="0" indent="0">
@@ -13638,7 +13672,12 @@
             <p:ph idx="1"/>
           </p:nvPr>
         </p:nvSpPr>
-        <p:spPr/>
+        <p:spPr>
+          <a:xfrm>
+            <a:off x="1141413" y="2249487"/>
+            <a:ext cx="4847264" cy="3541714"/>
+          </a:xfrm>
+        </p:spPr>
         <p:txBody>
           <a:bodyPr/>
           <a:lstStyle/>
@@ -13646,6 +13685,10 @@
             <a:pPr marL="0" indent="0">
               <a:buNone/>
             </a:pPr>
+            <a:r>
+              <a:rPr lang="en-US" dirty="0" smtClean="0"/>
+              <a:t>The initial condition was not great. It was a head and shoulders mounted on a motorized platform. All of our motor controllers were missing along with the LEGO NXT brick and the face skin was beyond repair.</a:t>
+            </a:r>
             <a:endParaRPr lang="en-US" dirty="0"/>
           </a:p>
         </p:txBody>
@@ -13841,7 +13884,23 @@
           <a:bodyPr/>
           <a:lstStyle/>
           <a:p>
-            <a:endParaRPr lang="en-US"/>
+            <a:r>
+              <a:rPr lang="en-US" dirty="0" smtClean="0"/>
+              <a:t>Complete mobility control of robot</a:t>
+            </a:r>
+          </a:p>
+          <a:p>
+            <a:r>
+              <a:rPr lang="en-US" dirty="0" smtClean="0"/>
+              <a:t>Complete control of arm with 6 degrees of freedom</a:t>
+            </a:r>
+          </a:p>
+          <a:p>
+            <a:r>
+              <a:rPr lang="en-US" dirty="0" smtClean="0"/>
+              <a:t>Ability to switch between arm mode and drive mode</a:t>
+            </a:r>
+            <a:endParaRPr lang="en-US" dirty="0"/>
           </a:p>
         </p:txBody>
       </p:sp>
@@ -13920,7 +13979,49 @@
           <a:bodyPr/>
           <a:lstStyle/>
           <a:p>
-            <a:endParaRPr lang="en-US"/>
+            <a:r>
+              <a:rPr lang="en-US" dirty="0" smtClean="0"/>
+              <a:t>Original plan involved Kinect and laptop mounted on robot</a:t>
+            </a:r>
+          </a:p>
+          <a:p>
+            <a:pPr lvl="1"/>
+            <a:r>
+              <a:rPr lang="en-US" dirty="0" smtClean="0"/>
+              <a:t>Kinect requires 120VAC</a:t>
+            </a:r>
+          </a:p>
+          <a:p>
+            <a:pPr lvl="1"/>
+            <a:r>
+              <a:rPr lang="en-US" dirty="0" smtClean="0"/>
+              <a:t>Extension cords??? No thanks…</a:t>
+            </a:r>
+            <a:endParaRPr lang="en-US" dirty="0" smtClean="0"/>
+          </a:p>
+          <a:p>
+            <a:r>
+              <a:rPr lang="en-US" dirty="0" smtClean="0"/>
+              <a:t>Too much weight for 12VDC motors</a:t>
+            </a:r>
+          </a:p>
+          <a:p>
+            <a:r>
+              <a:rPr lang="en-US" dirty="0" smtClean="0"/>
+              <a:t>Continuous rotation servos</a:t>
+            </a:r>
+          </a:p>
+          <a:p>
+            <a:r>
+              <a:rPr lang="en-US" dirty="0" smtClean="0"/>
+              <a:t>Bad left/right shoulder servo</a:t>
+            </a:r>
+          </a:p>
+          <a:p>
+            <a:endParaRPr lang="en-US" dirty="0" smtClean="0"/>
+          </a:p>
+          <a:p>
+            <a:endParaRPr lang="en-US" dirty="0"/>
           </a:p>
         </p:txBody>
       </p:sp>

</xml_diff>